<commit_message>
Adding materials and methods
</commit_message>
<xml_diff>
--- a/report/01.Chapters/02.Background/figures.pptx
+++ b/report/01.Chapters/02.Background/figures.pptx
@@ -260,7 +260,7 @@
           <a:p>
             <a:fld id="{6DBDA6B4-5921-4F28-BD94-5691BC1A6D75}" type="datetimeFigureOut">
               <a:rPr lang="pt-BR" smtClean="0"/>
-              <a:t>01/06/2020</a:t>
+              <a:t>06/06/2020</a:t>
             </a:fld>
             <a:endParaRPr lang="pt-BR"/>
           </a:p>
@@ -458,7 +458,7 @@
           <a:p>
             <a:fld id="{6DBDA6B4-5921-4F28-BD94-5691BC1A6D75}" type="datetimeFigureOut">
               <a:rPr lang="pt-BR" smtClean="0"/>
-              <a:t>01/06/2020</a:t>
+              <a:t>06/06/2020</a:t>
             </a:fld>
             <a:endParaRPr lang="pt-BR"/>
           </a:p>
@@ -666,7 +666,7 @@
           <a:p>
             <a:fld id="{6DBDA6B4-5921-4F28-BD94-5691BC1A6D75}" type="datetimeFigureOut">
               <a:rPr lang="pt-BR" smtClean="0"/>
-              <a:t>01/06/2020</a:t>
+              <a:t>06/06/2020</a:t>
             </a:fld>
             <a:endParaRPr lang="pt-BR"/>
           </a:p>
@@ -864,7 +864,7 @@
           <a:p>
             <a:fld id="{6DBDA6B4-5921-4F28-BD94-5691BC1A6D75}" type="datetimeFigureOut">
               <a:rPr lang="pt-BR" smtClean="0"/>
-              <a:t>01/06/2020</a:t>
+              <a:t>06/06/2020</a:t>
             </a:fld>
             <a:endParaRPr lang="pt-BR"/>
           </a:p>
@@ -1139,7 +1139,7 @@
           <a:p>
             <a:fld id="{6DBDA6B4-5921-4F28-BD94-5691BC1A6D75}" type="datetimeFigureOut">
               <a:rPr lang="pt-BR" smtClean="0"/>
-              <a:t>01/06/2020</a:t>
+              <a:t>06/06/2020</a:t>
             </a:fld>
             <a:endParaRPr lang="pt-BR"/>
           </a:p>
@@ -1404,7 +1404,7 @@
           <a:p>
             <a:fld id="{6DBDA6B4-5921-4F28-BD94-5691BC1A6D75}" type="datetimeFigureOut">
               <a:rPr lang="pt-BR" smtClean="0"/>
-              <a:t>01/06/2020</a:t>
+              <a:t>06/06/2020</a:t>
             </a:fld>
             <a:endParaRPr lang="pt-BR"/>
           </a:p>
@@ -1816,7 +1816,7 @@
           <a:p>
             <a:fld id="{6DBDA6B4-5921-4F28-BD94-5691BC1A6D75}" type="datetimeFigureOut">
               <a:rPr lang="pt-BR" smtClean="0"/>
-              <a:t>01/06/2020</a:t>
+              <a:t>06/06/2020</a:t>
             </a:fld>
             <a:endParaRPr lang="pt-BR"/>
           </a:p>
@@ -1957,7 +1957,7 @@
           <a:p>
             <a:fld id="{6DBDA6B4-5921-4F28-BD94-5691BC1A6D75}" type="datetimeFigureOut">
               <a:rPr lang="pt-BR" smtClean="0"/>
-              <a:t>01/06/2020</a:t>
+              <a:t>06/06/2020</a:t>
             </a:fld>
             <a:endParaRPr lang="pt-BR"/>
           </a:p>
@@ -2070,7 +2070,7 @@
           <a:p>
             <a:fld id="{6DBDA6B4-5921-4F28-BD94-5691BC1A6D75}" type="datetimeFigureOut">
               <a:rPr lang="pt-BR" smtClean="0"/>
-              <a:t>01/06/2020</a:t>
+              <a:t>06/06/2020</a:t>
             </a:fld>
             <a:endParaRPr lang="pt-BR"/>
           </a:p>
@@ -2381,7 +2381,7 @@
           <a:p>
             <a:fld id="{6DBDA6B4-5921-4F28-BD94-5691BC1A6D75}" type="datetimeFigureOut">
               <a:rPr lang="pt-BR" smtClean="0"/>
-              <a:t>01/06/2020</a:t>
+              <a:t>06/06/2020</a:t>
             </a:fld>
             <a:endParaRPr lang="pt-BR"/>
           </a:p>
@@ -2669,7 +2669,7 @@
           <a:p>
             <a:fld id="{6DBDA6B4-5921-4F28-BD94-5691BC1A6D75}" type="datetimeFigureOut">
               <a:rPr lang="pt-BR" smtClean="0"/>
-              <a:t>01/06/2020</a:t>
+              <a:t>06/06/2020</a:t>
             </a:fld>
             <a:endParaRPr lang="pt-BR"/>
           </a:p>
@@ -2910,7 +2910,7 @@
           <a:p>
             <a:fld id="{6DBDA6B4-5921-4F28-BD94-5691BC1A6D75}" type="datetimeFigureOut">
               <a:rPr lang="pt-BR" smtClean="0"/>
-              <a:t>01/06/2020</a:t>
+              <a:t>06/06/2020</a:t>
             </a:fld>
             <a:endParaRPr lang="pt-BR"/>
           </a:p>
@@ -3342,13 +3342,13 @@
           <p:nvPr>
             <p:extLst>
               <p:ext uri="{D42A27DB-BD31-4B8C-83A1-F6EECF244321}">
-                <p14:modId xmlns:p14="http://schemas.microsoft.com/office/powerpoint/2010/main" val="2639789319"/>
+                <p14:modId xmlns:p14="http://schemas.microsoft.com/office/powerpoint/2010/main" val="1483226141"/>
               </p:ext>
             </p:extLst>
           </p:nvPr>
         </p:nvGraphicFramePr>
         <p:xfrm>
-          <a:off x="1447701" y="2160270"/>
+          <a:off x="1527904" y="3254974"/>
           <a:ext cx="9136191" cy="1483360"/>
         </p:xfrm>
         <a:graphic>
@@ -4570,7 +4570,7 @@
         </p:nvGrpSpPr>
         <p:grpSpPr>
           <a:xfrm>
-            <a:off x="1163828" y="725784"/>
+            <a:off x="1244031" y="1820488"/>
             <a:ext cx="9724645" cy="923332"/>
             <a:chOff x="928892" y="849463"/>
             <a:chExt cx="9724645" cy="923332"/>
@@ -5029,7 +5029,7 @@
         </p:nvGrpSpPr>
         <p:grpSpPr>
           <a:xfrm>
-            <a:off x="3361386" y="1027884"/>
+            <a:off x="4457404" y="2633056"/>
             <a:ext cx="3277193" cy="1591888"/>
             <a:chOff x="3361386" y="1027884"/>
             <a:chExt cx="3277193" cy="1591888"/>

</xml_diff>